<commit_message>
new code quy trình kho 8:51 19-11-2024
</commit_message>
<xml_diff>
--- a/public/images/Kho/QTQLNVL_ITQRKCCTTPLVDTVCV_18112024.pptx
+++ b/public/images/Kho/QTQLNVL_ITQRKCCTTPLVDTVCV_18112024.pptx
@@ -270,7 +270,7 @@
           <a:p>
             <a:fld id="{37930DB5-C952-4A1D-A434-FE14604BB29D}" type="datetimeFigureOut">
               <a:rPr lang="en-US" smtClean="0"/>
-              <a:t>18-11-2024</a:t>
+              <a:t>19-11-2024</a:t>
             </a:fld>
             <a:endParaRPr lang="en-US"/>
           </a:p>
@@ -468,7 +468,7 @@
           <a:p>
             <a:fld id="{37930DB5-C952-4A1D-A434-FE14604BB29D}" type="datetimeFigureOut">
               <a:rPr lang="en-US" smtClean="0"/>
-              <a:t>18-11-2024</a:t>
+              <a:t>19-11-2024</a:t>
             </a:fld>
             <a:endParaRPr lang="en-US"/>
           </a:p>
@@ -676,7 +676,7 @@
           <a:p>
             <a:fld id="{37930DB5-C952-4A1D-A434-FE14604BB29D}" type="datetimeFigureOut">
               <a:rPr lang="en-US" smtClean="0"/>
-              <a:t>18-11-2024</a:t>
+              <a:t>19-11-2024</a:t>
             </a:fld>
             <a:endParaRPr lang="en-US"/>
           </a:p>
@@ -874,7 +874,7 @@
           <a:p>
             <a:fld id="{37930DB5-C952-4A1D-A434-FE14604BB29D}" type="datetimeFigureOut">
               <a:rPr lang="en-US" smtClean="0"/>
-              <a:t>18-11-2024</a:t>
+              <a:t>19-11-2024</a:t>
             </a:fld>
             <a:endParaRPr lang="en-US"/>
           </a:p>
@@ -1149,7 +1149,7 @@
           <a:p>
             <a:fld id="{37930DB5-C952-4A1D-A434-FE14604BB29D}" type="datetimeFigureOut">
               <a:rPr lang="en-US" smtClean="0"/>
-              <a:t>18-11-2024</a:t>
+              <a:t>19-11-2024</a:t>
             </a:fld>
             <a:endParaRPr lang="en-US"/>
           </a:p>
@@ -1414,7 +1414,7 @@
           <a:p>
             <a:fld id="{37930DB5-C952-4A1D-A434-FE14604BB29D}" type="datetimeFigureOut">
               <a:rPr lang="en-US" smtClean="0"/>
-              <a:t>18-11-2024</a:t>
+              <a:t>19-11-2024</a:t>
             </a:fld>
             <a:endParaRPr lang="en-US"/>
           </a:p>
@@ -1826,7 +1826,7 @@
           <a:p>
             <a:fld id="{37930DB5-C952-4A1D-A434-FE14604BB29D}" type="datetimeFigureOut">
               <a:rPr lang="en-US" smtClean="0"/>
-              <a:t>18-11-2024</a:t>
+              <a:t>19-11-2024</a:t>
             </a:fld>
             <a:endParaRPr lang="en-US"/>
           </a:p>
@@ -1967,7 +1967,7 @@
           <a:p>
             <a:fld id="{37930DB5-C952-4A1D-A434-FE14604BB29D}" type="datetimeFigureOut">
               <a:rPr lang="en-US" smtClean="0"/>
-              <a:t>18-11-2024</a:t>
+              <a:t>19-11-2024</a:t>
             </a:fld>
             <a:endParaRPr lang="en-US"/>
           </a:p>
@@ -2080,7 +2080,7 @@
           <a:p>
             <a:fld id="{37930DB5-C952-4A1D-A434-FE14604BB29D}" type="datetimeFigureOut">
               <a:rPr lang="en-US" smtClean="0"/>
-              <a:t>18-11-2024</a:t>
+              <a:t>19-11-2024</a:t>
             </a:fld>
             <a:endParaRPr lang="en-US"/>
           </a:p>
@@ -2391,7 +2391,7 @@
           <a:p>
             <a:fld id="{37930DB5-C952-4A1D-A434-FE14604BB29D}" type="datetimeFigureOut">
               <a:rPr lang="en-US" smtClean="0"/>
-              <a:t>18-11-2024</a:t>
+              <a:t>19-11-2024</a:t>
             </a:fld>
             <a:endParaRPr lang="en-US"/>
           </a:p>
@@ -2679,7 +2679,7 @@
           <a:p>
             <a:fld id="{37930DB5-C952-4A1D-A434-FE14604BB29D}" type="datetimeFigureOut">
               <a:rPr lang="en-US" smtClean="0"/>
-              <a:t>18-11-2024</a:t>
+              <a:t>19-11-2024</a:t>
             </a:fld>
             <a:endParaRPr lang="en-US"/>
           </a:p>
@@ -2920,7 +2920,7 @@
           <a:p>
             <a:fld id="{37930DB5-C952-4A1D-A434-FE14604BB29D}" type="datetimeFigureOut">
               <a:rPr lang="en-US" smtClean="0"/>
-              <a:t>18-11-2024</a:t>
+              <a:t>19-11-2024</a:t>
             </a:fld>
             <a:endParaRPr lang="en-US"/>
           </a:p>
@@ -4274,7 +4274,7 @@
         <p:spPr>
           <a:xfrm>
             <a:off x="517068" y="3440222"/>
-            <a:ext cx="3155031" cy="338554"/>
+            <a:ext cx="6167073" cy="338554"/>
           </a:xfrm>
           <a:prstGeom prst="rect">
             <a:avLst/>
@@ -4330,7 +4330,97 @@
                 <a:ea typeface="Times New Roman" panose="02020603050405020304" pitchFamily="18" charset="0"/>
                 <a:cs typeface="Arial" panose="020B0604020202020204" pitchFamily="34" charset="0"/>
               </a:rPr>
-              <a:t> QR ren </a:t>
+              <a:t> QR Ren, </a:t>
+            </a:r>
+            <a:r>
+              <a:rPr lang="en-US" sz="1600" b="1" dirty="0" err="1">
+                <a:effectLst/>
+                <a:latin typeface="Arial" panose="020B0604020202020204" pitchFamily="34" charset="0"/>
+                <a:ea typeface="Times New Roman" panose="02020603050405020304" pitchFamily="18" charset="0"/>
+                <a:cs typeface="Arial" panose="020B0604020202020204" pitchFamily="34" charset="0"/>
+              </a:rPr>
+              <a:t>vải</a:t>
+            </a:r>
+            <a:r>
+              <a:rPr lang="en-US" sz="1600" b="1" dirty="0">
+                <a:effectLst/>
+                <a:latin typeface="Arial" panose="020B0604020202020204" pitchFamily="34" charset="0"/>
+                <a:ea typeface="Times New Roman" panose="02020603050405020304" pitchFamily="18" charset="0"/>
+                <a:cs typeface="Arial" panose="020B0604020202020204" pitchFamily="34" charset="0"/>
+              </a:rPr>
+              <a:t> hem, </a:t>
+            </a:r>
+            <a:r>
+              <a:rPr lang="en-US" sz="1600" b="1" dirty="0" err="1">
+                <a:effectLst/>
+                <a:latin typeface="Arial" panose="020B0604020202020204" pitchFamily="34" charset="0"/>
+                <a:ea typeface="Times New Roman" panose="02020603050405020304" pitchFamily="18" charset="0"/>
+                <a:cs typeface="Arial" panose="020B0604020202020204" pitchFamily="34" charset="0"/>
+              </a:rPr>
+              <a:t>vải</a:t>
+            </a:r>
+            <a:r>
+              <a:rPr lang="en-US" sz="1600" b="1" dirty="0">
+                <a:effectLst/>
+                <a:latin typeface="Arial" panose="020B0604020202020204" pitchFamily="34" charset="0"/>
+                <a:ea typeface="Times New Roman" panose="02020603050405020304" pitchFamily="18" charset="0"/>
+                <a:cs typeface="Arial" panose="020B0604020202020204" pitchFamily="34" charset="0"/>
+              </a:rPr>
+              <a:t> </a:t>
+            </a:r>
+            <a:r>
+              <a:rPr lang="en-US" sz="1600" b="1" dirty="0" err="1">
+                <a:effectLst/>
+                <a:latin typeface="Arial" panose="020B0604020202020204" pitchFamily="34" charset="0"/>
+                <a:ea typeface="Times New Roman" panose="02020603050405020304" pitchFamily="18" charset="0"/>
+                <a:cs typeface="Arial" panose="020B0604020202020204" pitchFamily="34" charset="0"/>
+              </a:rPr>
+              <a:t>ống</a:t>
+            </a:r>
+            <a:r>
+              <a:rPr lang="en-US" sz="1600" b="1" dirty="0">
+                <a:effectLst/>
+                <a:latin typeface="Arial" panose="020B0604020202020204" pitchFamily="34" charset="0"/>
+                <a:ea typeface="Times New Roman" panose="02020603050405020304" pitchFamily="18" charset="0"/>
+                <a:cs typeface="Arial" panose="020B0604020202020204" pitchFamily="34" charset="0"/>
+              </a:rPr>
+              <a:t> </a:t>
+            </a:r>
+            <a:r>
+              <a:rPr lang="en-US" sz="1600" b="1" dirty="0" err="1">
+                <a:effectLst/>
+                <a:latin typeface="Arial" panose="020B0604020202020204" pitchFamily="34" charset="0"/>
+                <a:ea typeface="Times New Roman" panose="02020603050405020304" pitchFamily="18" charset="0"/>
+                <a:cs typeface="Arial" panose="020B0604020202020204" pitchFamily="34" charset="0"/>
+              </a:rPr>
+              <a:t>dạng</a:t>
+            </a:r>
+            <a:r>
+              <a:rPr lang="en-US" sz="1600" b="1" dirty="0">
+                <a:effectLst/>
+                <a:latin typeface="Arial" panose="020B0604020202020204" pitchFamily="34" charset="0"/>
+                <a:ea typeface="Times New Roman" panose="02020603050405020304" pitchFamily="18" charset="0"/>
+                <a:cs typeface="Arial" panose="020B0604020202020204" pitchFamily="34" charset="0"/>
+              </a:rPr>
+              <a:t> </a:t>
+            </a:r>
+            <a:r>
+              <a:rPr lang="en-US" sz="1600" b="1" dirty="0" err="1">
+                <a:effectLst/>
+                <a:latin typeface="Arial" panose="020B0604020202020204" pitchFamily="34" charset="0"/>
+                <a:ea typeface="Times New Roman" panose="02020603050405020304" pitchFamily="18" charset="0"/>
+                <a:cs typeface="Arial" panose="020B0604020202020204" pitchFamily="34" charset="0"/>
+              </a:rPr>
+              <a:t>thùng</a:t>
+            </a:r>
+            <a:r>
+              <a:rPr lang="en-US" sz="1600" b="1" dirty="0">
+                <a:effectLst/>
+                <a:latin typeface="Arial" panose="020B0604020202020204" pitchFamily="34" charset="0"/>
+                <a:ea typeface="Times New Roman" panose="02020603050405020304" pitchFamily="18" charset="0"/>
+                <a:cs typeface="Arial" panose="020B0604020202020204" pitchFamily="34" charset="0"/>
+              </a:rPr>
+              <a:t> </a:t>
             </a:r>
             <a:r>
               <a:rPr lang="en-US" sz="1600" b="1" dirty="0" err="1">

</xml_diff>

<commit_message>
new code quy trinh kho 1:52 14-02-2025
</commit_message>
<xml_diff>
--- a/public/images/Kho/QTQLNVL_ITQRKCCTTPLVDTVCV_18112024.pptx
+++ b/public/images/Kho/QTQLNVL_ITQRKCCTTPLVDTVCV_18112024.pptx
@@ -270,7 +270,7 @@
           <a:p>
             <a:fld id="{37930DB5-C952-4A1D-A434-FE14604BB29D}" type="datetimeFigureOut">
               <a:rPr lang="en-US" smtClean="0"/>
-              <a:t>19-11-2024</a:t>
+              <a:t>14-02-2025</a:t>
             </a:fld>
             <a:endParaRPr lang="en-US"/>
           </a:p>
@@ -468,7 +468,7 @@
           <a:p>
             <a:fld id="{37930DB5-C952-4A1D-A434-FE14604BB29D}" type="datetimeFigureOut">
               <a:rPr lang="en-US" smtClean="0"/>
-              <a:t>19-11-2024</a:t>
+              <a:t>14-02-2025</a:t>
             </a:fld>
             <a:endParaRPr lang="en-US"/>
           </a:p>
@@ -676,7 +676,7 @@
           <a:p>
             <a:fld id="{37930DB5-C952-4A1D-A434-FE14604BB29D}" type="datetimeFigureOut">
               <a:rPr lang="en-US" smtClean="0"/>
-              <a:t>19-11-2024</a:t>
+              <a:t>14-02-2025</a:t>
             </a:fld>
             <a:endParaRPr lang="en-US"/>
           </a:p>
@@ -874,7 +874,7 @@
           <a:p>
             <a:fld id="{37930DB5-C952-4A1D-A434-FE14604BB29D}" type="datetimeFigureOut">
               <a:rPr lang="en-US" smtClean="0"/>
-              <a:t>19-11-2024</a:t>
+              <a:t>14-02-2025</a:t>
             </a:fld>
             <a:endParaRPr lang="en-US"/>
           </a:p>
@@ -1149,7 +1149,7 @@
           <a:p>
             <a:fld id="{37930DB5-C952-4A1D-A434-FE14604BB29D}" type="datetimeFigureOut">
               <a:rPr lang="en-US" smtClean="0"/>
-              <a:t>19-11-2024</a:t>
+              <a:t>14-02-2025</a:t>
             </a:fld>
             <a:endParaRPr lang="en-US"/>
           </a:p>
@@ -1414,7 +1414,7 @@
           <a:p>
             <a:fld id="{37930DB5-C952-4A1D-A434-FE14604BB29D}" type="datetimeFigureOut">
               <a:rPr lang="en-US" smtClean="0"/>
-              <a:t>19-11-2024</a:t>
+              <a:t>14-02-2025</a:t>
             </a:fld>
             <a:endParaRPr lang="en-US"/>
           </a:p>
@@ -1826,7 +1826,7 @@
           <a:p>
             <a:fld id="{37930DB5-C952-4A1D-A434-FE14604BB29D}" type="datetimeFigureOut">
               <a:rPr lang="en-US" smtClean="0"/>
-              <a:t>19-11-2024</a:t>
+              <a:t>14-02-2025</a:t>
             </a:fld>
             <a:endParaRPr lang="en-US"/>
           </a:p>
@@ -1967,7 +1967,7 @@
           <a:p>
             <a:fld id="{37930DB5-C952-4A1D-A434-FE14604BB29D}" type="datetimeFigureOut">
               <a:rPr lang="en-US" smtClean="0"/>
-              <a:t>19-11-2024</a:t>
+              <a:t>14-02-2025</a:t>
             </a:fld>
             <a:endParaRPr lang="en-US"/>
           </a:p>
@@ -2080,7 +2080,7 @@
           <a:p>
             <a:fld id="{37930DB5-C952-4A1D-A434-FE14604BB29D}" type="datetimeFigureOut">
               <a:rPr lang="en-US" smtClean="0"/>
-              <a:t>19-11-2024</a:t>
+              <a:t>14-02-2025</a:t>
             </a:fld>
             <a:endParaRPr lang="en-US"/>
           </a:p>
@@ -2391,7 +2391,7 @@
           <a:p>
             <a:fld id="{37930DB5-C952-4A1D-A434-FE14604BB29D}" type="datetimeFigureOut">
               <a:rPr lang="en-US" smtClean="0"/>
-              <a:t>19-11-2024</a:t>
+              <a:t>14-02-2025</a:t>
             </a:fld>
             <a:endParaRPr lang="en-US"/>
           </a:p>
@@ -2679,7 +2679,7 @@
           <a:p>
             <a:fld id="{37930DB5-C952-4A1D-A434-FE14604BB29D}" type="datetimeFigureOut">
               <a:rPr lang="en-US" smtClean="0"/>
-              <a:t>19-11-2024</a:t>
+              <a:t>14-02-2025</a:t>
             </a:fld>
             <a:endParaRPr lang="en-US"/>
           </a:p>
@@ -2920,7 +2920,7 @@
           <a:p>
             <a:fld id="{37930DB5-C952-4A1D-A434-FE14604BB29D}" type="datetimeFigureOut">
               <a:rPr lang="en-US" smtClean="0"/>
-              <a:t>19-11-2024</a:t>
+              <a:t>14-02-2025</a:t>
             </a:fld>
             <a:endParaRPr lang="en-US"/>
           </a:p>
@@ -4457,6 +4457,194 @@
                 <a:cs typeface="Arial" panose="020B0604020202020204" pitchFamily="34" charset="0"/>
               </a:rPr>
               <a:t>.</a:t>
+            </a:r>
+            <a:endParaRPr lang="en-US" sz="1600" b="1" dirty="0">
+              <a:latin typeface="Arial" panose="020B0604020202020204" pitchFamily="34" charset="0"/>
+              <a:cs typeface="Arial" panose="020B0604020202020204" pitchFamily="34" charset="0"/>
+            </a:endParaRPr>
+          </a:p>
+        </p:txBody>
+      </p:sp>
+      <p:sp>
+        <p:nvSpPr>
+          <p:cNvPr id="2" name="TextBox 1">
+            <a:extLst>
+              <a:ext uri="{FF2B5EF4-FFF2-40B4-BE49-F238E27FC236}">
+                <a16:creationId xmlns:a16="http://schemas.microsoft.com/office/drawing/2014/main" id="{8ED1BE42-EF19-BEBC-6220-6F4093FF79F6}"/>
+              </a:ext>
+            </a:extLst>
+          </p:cNvPr>
+          <p:cNvSpPr txBox="1"/>
+          <p:nvPr/>
+        </p:nvSpPr>
+        <p:spPr>
+          <a:xfrm>
+            <a:off x="517068" y="4059894"/>
+            <a:ext cx="5715026" cy="338554"/>
+          </a:xfrm>
+          <a:prstGeom prst="rect">
+            <a:avLst/>
+          </a:prstGeom>
+          <a:noFill/>
+        </p:spPr>
+        <p:txBody>
+          <a:bodyPr wrap="none" rtlCol="0">
+            <a:spAutoFit/>
+          </a:bodyPr>
+          <a:lstStyle/>
+          <a:p>
+            <a:r>
+              <a:rPr lang="en-US" sz="1600" b="1" dirty="0">
+                <a:effectLst/>
+                <a:latin typeface="Arial" panose="020B0604020202020204" pitchFamily="34" charset="0"/>
+                <a:ea typeface="Times New Roman" panose="02020603050405020304" pitchFamily="18" charset="0"/>
+                <a:cs typeface="Arial" panose="020B0604020202020204" pitchFamily="34" charset="0"/>
+              </a:rPr>
+              <a:t>4.6 </a:t>
+            </a:r>
+            <a:r>
+              <a:rPr lang="en-US" sz="1600" b="1" dirty="0" err="1">
+                <a:effectLst/>
+                <a:latin typeface="Arial" panose="020B0604020202020204" pitchFamily="34" charset="0"/>
+                <a:ea typeface="Times New Roman" panose="02020603050405020304" pitchFamily="18" charset="0"/>
+                <a:cs typeface="Arial" panose="020B0604020202020204" pitchFamily="34" charset="0"/>
+              </a:rPr>
+              <a:t>Dán</a:t>
+            </a:r>
+            <a:r>
+              <a:rPr lang="en-US" sz="1600" b="1" dirty="0">
+                <a:effectLst/>
+                <a:latin typeface="Arial" panose="020B0604020202020204" pitchFamily="34" charset="0"/>
+                <a:ea typeface="Times New Roman" panose="02020603050405020304" pitchFamily="18" charset="0"/>
+                <a:cs typeface="Arial" panose="020B0604020202020204" pitchFamily="34" charset="0"/>
+              </a:rPr>
+              <a:t> </a:t>
+            </a:r>
+            <a:r>
+              <a:rPr lang="en-US" sz="1600" b="1" dirty="0" err="1">
+                <a:effectLst/>
+                <a:latin typeface="Arial" panose="020B0604020202020204" pitchFamily="34" charset="0"/>
+                <a:ea typeface="Times New Roman" panose="02020603050405020304" pitchFamily="18" charset="0"/>
+                <a:cs typeface="Arial" panose="020B0604020202020204" pitchFamily="34" charset="0"/>
+              </a:rPr>
+              <a:t>tem</a:t>
+            </a:r>
+            <a:r>
+              <a:rPr lang="en-US" sz="1600" b="1" dirty="0">
+                <a:effectLst/>
+                <a:latin typeface="Arial" panose="020B0604020202020204" pitchFamily="34" charset="0"/>
+                <a:ea typeface="Times New Roman" panose="02020603050405020304" pitchFamily="18" charset="0"/>
+                <a:cs typeface="Arial" panose="020B0604020202020204" pitchFamily="34" charset="0"/>
+              </a:rPr>
+              <a:t> QR </a:t>
+            </a:r>
+            <a:r>
+              <a:rPr lang="en-US" sz="1600" b="1" dirty="0" err="1">
+                <a:effectLst/>
+                <a:latin typeface="Arial" panose="020B0604020202020204" pitchFamily="34" charset="0"/>
+                <a:ea typeface="Times New Roman" panose="02020603050405020304" pitchFamily="18" charset="0"/>
+                <a:cs typeface="Arial" panose="020B0604020202020204" pitchFamily="34" charset="0"/>
+              </a:rPr>
+              <a:t>cho</a:t>
+            </a:r>
+            <a:r>
+              <a:rPr lang="en-US" sz="1600" b="1" dirty="0">
+                <a:effectLst/>
+                <a:latin typeface="Arial" panose="020B0604020202020204" pitchFamily="34" charset="0"/>
+                <a:ea typeface="Times New Roman" panose="02020603050405020304" pitchFamily="18" charset="0"/>
+                <a:cs typeface="Arial" panose="020B0604020202020204" pitchFamily="34" charset="0"/>
+              </a:rPr>
+              <a:t> </a:t>
+            </a:r>
+            <a:r>
+              <a:rPr lang="en-US" sz="1600" b="1" dirty="0" err="1">
+                <a:effectLst/>
+                <a:latin typeface="Arial" panose="020B0604020202020204" pitchFamily="34" charset="0"/>
+                <a:ea typeface="Times New Roman" panose="02020603050405020304" pitchFamily="18" charset="0"/>
+                <a:cs typeface="Arial" panose="020B0604020202020204" pitchFamily="34" charset="0"/>
+              </a:rPr>
+              <a:t>Vải</a:t>
+            </a:r>
+            <a:r>
+              <a:rPr lang="en-US" sz="1600" b="1" dirty="0">
+                <a:effectLst/>
+                <a:latin typeface="Arial" panose="020B0604020202020204" pitchFamily="34" charset="0"/>
+                <a:ea typeface="Times New Roman" panose="02020603050405020304" pitchFamily="18" charset="0"/>
+                <a:cs typeface="Arial" panose="020B0604020202020204" pitchFamily="34" charset="0"/>
+              </a:rPr>
+              <a:t> + Lining </a:t>
+            </a:r>
+            <a:r>
+              <a:rPr lang="en-US" sz="1600" b="1" dirty="0" err="1">
+                <a:effectLst/>
+                <a:latin typeface="Arial" panose="020B0604020202020204" pitchFamily="34" charset="0"/>
+                <a:ea typeface="Times New Roman" panose="02020603050405020304" pitchFamily="18" charset="0"/>
+                <a:cs typeface="Arial" panose="020B0604020202020204" pitchFamily="34" charset="0"/>
+              </a:rPr>
+              <a:t>dạng</a:t>
+            </a:r>
+            <a:r>
+              <a:rPr lang="en-US" sz="1600" b="1" dirty="0">
+                <a:effectLst/>
+                <a:latin typeface="Arial" panose="020B0604020202020204" pitchFamily="34" charset="0"/>
+                <a:ea typeface="Times New Roman" panose="02020603050405020304" pitchFamily="18" charset="0"/>
+                <a:cs typeface="Arial" panose="020B0604020202020204" pitchFamily="34" charset="0"/>
+              </a:rPr>
+              <a:t> </a:t>
+            </a:r>
+            <a:r>
+              <a:rPr lang="en-US" sz="1600" b="1" dirty="0" err="1">
+                <a:effectLst/>
+                <a:latin typeface="Arial" panose="020B0604020202020204" pitchFamily="34" charset="0"/>
+                <a:ea typeface="Times New Roman" panose="02020603050405020304" pitchFamily="18" charset="0"/>
+                <a:cs typeface="Arial" panose="020B0604020202020204" pitchFamily="34" charset="0"/>
+              </a:rPr>
+              <a:t>cuộn</a:t>
+            </a:r>
+            <a:r>
+              <a:rPr lang="en-US" sz="1600" b="1" dirty="0">
+                <a:effectLst/>
+                <a:latin typeface="Arial" panose="020B0604020202020204" pitchFamily="34" charset="0"/>
+                <a:ea typeface="Times New Roman" panose="02020603050405020304" pitchFamily="18" charset="0"/>
+                <a:cs typeface="Arial" panose="020B0604020202020204" pitchFamily="34" charset="0"/>
+              </a:rPr>
+              <a:t> </a:t>
+            </a:r>
+            <a:r>
+              <a:rPr lang="en-US" sz="1600" b="1" dirty="0" err="1">
+                <a:effectLst/>
+                <a:latin typeface="Arial" panose="020B0604020202020204" pitchFamily="34" charset="0"/>
+                <a:ea typeface="Times New Roman" panose="02020603050405020304" pitchFamily="18" charset="0"/>
+                <a:cs typeface="Arial" panose="020B0604020202020204" pitchFamily="34" charset="0"/>
+              </a:rPr>
+              <a:t>có</a:t>
+            </a:r>
+            <a:r>
+              <a:rPr lang="en-US" sz="1600" b="1" dirty="0">
+                <a:effectLst/>
+                <a:latin typeface="Arial" panose="020B0604020202020204" pitchFamily="34" charset="0"/>
+                <a:ea typeface="Times New Roman" panose="02020603050405020304" pitchFamily="18" charset="0"/>
+                <a:cs typeface="Arial" panose="020B0604020202020204" pitchFamily="34" charset="0"/>
+              </a:rPr>
+              <a:t> chi </a:t>
+            </a:r>
+            <a:r>
+              <a:rPr lang="en-US" sz="1600" b="1" dirty="0" err="1">
+                <a:effectLst/>
+                <a:latin typeface="Arial" panose="020B0604020202020204" pitchFamily="34" charset="0"/>
+                <a:ea typeface="Times New Roman" panose="02020603050405020304" pitchFamily="18" charset="0"/>
+                <a:cs typeface="Arial" panose="020B0604020202020204" pitchFamily="34" charset="0"/>
+              </a:rPr>
+              <a:t>tiết</a:t>
+            </a:r>
+            <a:r>
+              <a:rPr lang="en-US" sz="1600" b="1" dirty="0">
+                <a:effectLst/>
+                <a:latin typeface="Arial" panose="020B0604020202020204" pitchFamily="34" charset="0"/>
+                <a:ea typeface="Times New Roman" panose="02020603050405020304" pitchFamily="18" charset="0"/>
+                <a:cs typeface="Arial" panose="020B0604020202020204" pitchFamily="34" charset="0"/>
+              </a:rPr>
+              <a:t>. </a:t>
             </a:r>
             <a:endParaRPr lang="en-US" sz="1600" b="1" dirty="0">
               <a:latin typeface="Arial" panose="020B0604020202020204" pitchFamily="34" charset="0"/>

</xml_diff>